<commit_message>
changed list to seznam
</commit_message>
<xml_diff>
--- a/Minimální kostra grafu.pptx
+++ b/Minimální kostra grafu.pptx
@@ -303,7 +303,7 @@
           <a:p>
             <a:fld id="{91F9259A-1FE3-4FF9-8A07-BDD8177164ED}" type="datetime4">
               <a:rPr lang="en-US" smtClean="0"/>
-              <a:t>December 6, 2023</a:t>
+              <a:t>December 7, 2023</a:t>
             </a:fld>
             <a:endParaRPr lang="en-US"/>
           </a:p>
@@ -478,7 +478,7 @@
           <a:p>
             <a:fld id="{E5CC3C8F-D4A7-4EAD-92AD-82C91CB8BB85}" type="datetime4">
               <a:rPr lang="en-US" smtClean="0"/>
-              <a:t>December 6, 2023</a:t>
+              <a:t>December 7, 2023</a:t>
             </a:fld>
             <a:endParaRPr lang="en-US"/>
           </a:p>
@@ -715,7 +715,7 @@
           <a:p>
             <a:fld id="{BC011D41-E33C-4BC7-8272-37E8417FD097}" type="datetime4">
               <a:rPr lang="en-US" smtClean="0"/>
-              <a:t>December 6, 2023</a:t>
+              <a:t>December 7, 2023</a:t>
             </a:fld>
             <a:endParaRPr lang="en-US"/>
           </a:p>
@@ -920,7 +920,7 @@
           <a:p>
             <a:fld id="{5D340FED-6E95-4177-A7EF-CD303B9E611D}" type="datetime4">
               <a:rPr lang="en-US" smtClean="0"/>
-              <a:t>December 6, 2023</a:t>
+              <a:t>December 7, 2023</a:t>
             </a:fld>
             <a:endParaRPr lang="en-US"/>
           </a:p>
@@ -1210,7 +1210,7 @@
           <a:p>
             <a:fld id="{477962CB-39AD-45A9-800F-54DAB53D6021}" type="datetime4">
               <a:rPr lang="en-US" smtClean="0"/>
-              <a:t>December 6, 2023</a:t>
+              <a:t>December 7, 2023</a:t>
             </a:fld>
             <a:endParaRPr lang="en-US"/>
           </a:p>
@@ -1494,7 +1494,7 @@
           <a:p>
             <a:fld id="{2DEDF93D-55AB-4606-B9D7-742F1FC51983}" type="datetime4">
               <a:rPr lang="en-US" smtClean="0"/>
-              <a:t>December 6, 2023</a:t>
+              <a:t>December 7, 2023</a:t>
             </a:fld>
             <a:endParaRPr lang="en-US" dirty="0"/>
           </a:p>
@@ -1911,7 +1911,7 @@
           <a:p>
             <a:fld id="{DDF2841D-FB5C-47AB-B2FF-32E855C1EA71}" type="datetime4">
               <a:rPr lang="en-US" smtClean="0"/>
-              <a:t>December 6, 2023</a:t>
+              <a:t>December 7, 2023</a:t>
             </a:fld>
             <a:endParaRPr lang="en-US"/>
           </a:p>
@@ -2052,7 +2052,7 @@
           <a:p>
             <a:fld id="{118537E9-D174-424D-BEE8-AFC4CA5F9F97}" type="datetime4">
               <a:rPr lang="en-US" smtClean="0"/>
-              <a:t>December 6, 2023</a:t>
+              <a:t>December 7, 2023</a:t>
             </a:fld>
             <a:endParaRPr lang="en-US"/>
           </a:p>
@@ -2193,7 +2193,7 @@
           <a:p>
             <a:fld id="{1C7A44C0-F7AC-49C2-8289-1E7A86D9FB50}" type="datetime4">
               <a:rPr lang="en-US" smtClean="0"/>
-              <a:t>December 6, 2023</a:t>
+              <a:t>December 7, 2023</a:t>
             </a:fld>
             <a:endParaRPr lang="en-US"/>
           </a:p>
@@ -2508,7 +2508,7 @@
           <a:p>
             <a:fld id="{73BB84BC-6E78-40D1-8831-40AB1F596614}" type="datetime4">
               <a:rPr lang="en-US" smtClean="0"/>
-              <a:t>December 6, 2023</a:t>
+              <a:t>December 7, 2023</a:t>
             </a:fld>
             <a:endParaRPr lang="en-US"/>
           </a:p>
@@ -2801,7 +2801,7 @@
           <a:p>
             <a:fld id="{ADFA080F-3961-4D42-BEDE-84A1FED032F1}" type="datetime4">
               <a:rPr lang="en-US" smtClean="0"/>
-              <a:t>December 6, 2023</a:t>
+              <a:t>December 7, 2023</a:t>
             </a:fld>
             <a:endParaRPr lang="en-US"/>
           </a:p>
@@ -3083,7 +3083,7 @@
             <a:fld id="{A33960BD-7AC1-4217-9611-AAA56D3EE38F}" type="datetime4">
               <a:rPr lang="en-US" smtClean="0"/>
               <a:pPr/>
-              <a:t>December 6, 2023</a:t>
+              <a:t>December 7, 2023</a:t>
             </a:fld>
             <a:endParaRPr lang="en-US" dirty="0">
               <a:latin typeface="+mn-lt"/>
@@ -5761,7 +5761,7 @@
                 <a:latin typeface="Times New Roman" panose="02020603050405020304" pitchFamily="18" charset="0"/>
                 <a:cs typeface="Times New Roman" panose="02020603050405020304" pitchFamily="18" charset="0"/>
               </a:rPr>
-              <a:t>List</a:t>
+              <a:t>Seznam</a:t>
             </a:r>
           </a:p>
           <a:p>
@@ -5799,16 +5799,12 @@
               </a:buClr>
             </a:pPr>
             <a:r>
-              <a:rPr lang="cs-CZ" sz="4400">
+              <a:rPr lang="cs-CZ" sz="4400" dirty="0">
                 <a:latin typeface="Times New Roman" panose="02020603050405020304" pitchFamily="18" charset="0"/>
                 <a:cs typeface="Times New Roman" panose="02020603050405020304" pitchFamily="18" charset="0"/>
               </a:rPr>
               <a:t>Množina</a:t>
             </a:r>
-            <a:endParaRPr lang="cs-CZ" sz="4400" dirty="0">
-              <a:latin typeface="Times New Roman" panose="02020603050405020304" pitchFamily="18" charset="0"/>
-              <a:cs typeface="Times New Roman" panose="02020603050405020304" pitchFamily="18" charset="0"/>
-            </a:endParaRPr>
           </a:p>
         </p:txBody>
       </p:sp>

</xml_diff>